<commit_message>
18_11_09 add post: apache tomcat server install
</commit_message>
<xml_diff>
--- a/pictures.pptx
+++ b/pictures.pptx
@@ -211,7 +211,7 @@
           <a:p>
             <a:fld id="{9761CF92-113C-9548-9F26-23F72E6F78AC}" type="datetimeFigureOut">
               <a:rPr kumimoji="1" lang="zh-TW" altLang="en-US" smtClean="0"/>
-              <a:t>2018/11/8</a:t>
+              <a:t>2018/11/9</a:t>
             </a:fld>
             <a:endParaRPr kumimoji="1" lang="zh-TW" altLang="en-US"/>
           </a:p>
@@ -709,7 +709,7 @@
           <a:p>
             <a:fld id="{99B93984-CD85-AB4D-B43D-91E4B748ABBB}" type="datetimeFigureOut">
               <a:rPr kumimoji="1" lang="zh-TW" altLang="en-US" smtClean="0"/>
-              <a:t>2018/11/8</a:t>
+              <a:t>2018/11/9</a:t>
             </a:fld>
             <a:endParaRPr kumimoji="1" lang="zh-TW" altLang="en-US"/>
           </a:p>
@@ -907,7 +907,7 @@
           <a:p>
             <a:fld id="{99B93984-CD85-AB4D-B43D-91E4B748ABBB}" type="datetimeFigureOut">
               <a:rPr kumimoji="1" lang="zh-TW" altLang="en-US" smtClean="0"/>
-              <a:t>2018/11/8</a:t>
+              <a:t>2018/11/9</a:t>
             </a:fld>
             <a:endParaRPr kumimoji="1" lang="zh-TW" altLang="en-US"/>
           </a:p>
@@ -1115,7 +1115,7 @@
           <a:p>
             <a:fld id="{99B93984-CD85-AB4D-B43D-91E4B748ABBB}" type="datetimeFigureOut">
               <a:rPr kumimoji="1" lang="zh-TW" altLang="en-US" smtClean="0"/>
-              <a:t>2018/11/8</a:t>
+              <a:t>2018/11/9</a:t>
             </a:fld>
             <a:endParaRPr kumimoji="1" lang="zh-TW" altLang="en-US"/>
           </a:p>
@@ -1313,7 +1313,7 @@
           <a:p>
             <a:fld id="{99B93984-CD85-AB4D-B43D-91E4B748ABBB}" type="datetimeFigureOut">
               <a:rPr kumimoji="1" lang="zh-TW" altLang="en-US" smtClean="0"/>
-              <a:t>2018/11/8</a:t>
+              <a:t>2018/11/9</a:t>
             </a:fld>
             <a:endParaRPr kumimoji="1" lang="zh-TW" altLang="en-US"/>
           </a:p>
@@ -1588,7 +1588,7 @@
           <a:p>
             <a:fld id="{99B93984-CD85-AB4D-B43D-91E4B748ABBB}" type="datetimeFigureOut">
               <a:rPr kumimoji="1" lang="zh-TW" altLang="en-US" smtClean="0"/>
-              <a:t>2018/11/8</a:t>
+              <a:t>2018/11/9</a:t>
             </a:fld>
             <a:endParaRPr kumimoji="1" lang="zh-TW" altLang="en-US"/>
           </a:p>
@@ -1853,7 +1853,7 @@
           <a:p>
             <a:fld id="{99B93984-CD85-AB4D-B43D-91E4B748ABBB}" type="datetimeFigureOut">
               <a:rPr kumimoji="1" lang="zh-TW" altLang="en-US" smtClean="0"/>
-              <a:t>2018/11/8</a:t>
+              <a:t>2018/11/9</a:t>
             </a:fld>
             <a:endParaRPr kumimoji="1" lang="zh-TW" altLang="en-US"/>
           </a:p>
@@ -2265,7 +2265,7 @@
           <a:p>
             <a:fld id="{99B93984-CD85-AB4D-B43D-91E4B748ABBB}" type="datetimeFigureOut">
               <a:rPr kumimoji="1" lang="zh-TW" altLang="en-US" smtClean="0"/>
-              <a:t>2018/11/8</a:t>
+              <a:t>2018/11/9</a:t>
             </a:fld>
             <a:endParaRPr kumimoji="1" lang="zh-TW" altLang="en-US"/>
           </a:p>
@@ -2406,7 +2406,7 @@
           <a:p>
             <a:fld id="{99B93984-CD85-AB4D-B43D-91E4B748ABBB}" type="datetimeFigureOut">
               <a:rPr kumimoji="1" lang="zh-TW" altLang="en-US" smtClean="0"/>
-              <a:t>2018/11/8</a:t>
+              <a:t>2018/11/9</a:t>
             </a:fld>
             <a:endParaRPr kumimoji="1" lang="zh-TW" altLang="en-US"/>
           </a:p>
@@ -2519,7 +2519,7 @@
           <a:p>
             <a:fld id="{99B93984-CD85-AB4D-B43D-91E4B748ABBB}" type="datetimeFigureOut">
               <a:rPr kumimoji="1" lang="zh-TW" altLang="en-US" smtClean="0"/>
-              <a:t>2018/11/8</a:t>
+              <a:t>2018/11/9</a:t>
             </a:fld>
             <a:endParaRPr kumimoji="1" lang="zh-TW" altLang="en-US"/>
           </a:p>
@@ -2830,7 +2830,7 @@
           <a:p>
             <a:fld id="{99B93984-CD85-AB4D-B43D-91E4B748ABBB}" type="datetimeFigureOut">
               <a:rPr kumimoji="1" lang="zh-TW" altLang="en-US" smtClean="0"/>
-              <a:t>2018/11/8</a:t>
+              <a:t>2018/11/9</a:t>
             </a:fld>
             <a:endParaRPr kumimoji="1" lang="zh-TW" altLang="en-US"/>
           </a:p>
@@ -3118,7 +3118,7 @@
           <a:p>
             <a:fld id="{99B93984-CD85-AB4D-B43D-91E4B748ABBB}" type="datetimeFigureOut">
               <a:rPr kumimoji="1" lang="zh-TW" altLang="en-US" smtClean="0"/>
-              <a:t>2018/11/8</a:t>
+              <a:t>2018/11/9</a:t>
             </a:fld>
             <a:endParaRPr kumimoji="1" lang="zh-TW" altLang="en-US"/>
           </a:p>
@@ -3359,7 +3359,7 @@
           <a:p>
             <a:fld id="{99B93984-CD85-AB4D-B43D-91E4B748ABBB}" type="datetimeFigureOut">
               <a:rPr kumimoji="1" lang="zh-TW" altLang="en-US" smtClean="0"/>
-              <a:t>2018/11/8</a:t>
+              <a:t>2018/11/9</a:t>
             </a:fld>
             <a:endParaRPr kumimoji="1" lang="zh-TW" altLang="en-US"/>
           </a:p>
@@ -4286,6 +4286,109 @@
           <a:chExt cx="0" cy="0"/>
         </a:xfrm>
       </p:grpSpPr>
+      <p:grpSp>
+        <p:nvGrpSpPr>
+          <p:cNvPr id="5" name="群組 4">
+            <a:extLst>
+              <a:ext uri="{FF2B5EF4-FFF2-40B4-BE49-F238E27FC236}">
+                <a16:creationId xmlns:a16="http://schemas.microsoft.com/office/drawing/2014/main" id="{6DAB1065-1464-9141-9100-5BC15739219B}"/>
+              </a:ext>
+            </a:extLst>
+          </p:cNvPr>
+          <p:cNvGrpSpPr/>
+          <p:nvPr/>
+        </p:nvGrpSpPr>
+        <p:grpSpPr>
+          <a:xfrm>
+            <a:off x="1829686" y="0"/>
+            <a:ext cx="8532628" cy="6858000"/>
+            <a:chOff x="1829686" y="0"/>
+            <a:chExt cx="8532628" cy="6858000"/>
+          </a:xfrm>
+        </p:grpSpPr>
+        <p:pic>
+          <p:nvPicPr>
+            <p:cNvPr id="3" name="圖片 2">
+              <a:extLst>
+                <a:ext uri="{FF2B5EF4-FFF2-40B4-BE49-F238E27FC236}">
+                  <a16:creationId xmlns:a16="http://schemas.microsoft.com/office/drawing/2014/main" id="{5D01DB7B-AAA6-854F-AA96-2D3CEC4959DD}"/>
+                </a:ext>
+              </a:extLst>
+            </p:cNvPr>
+            <p:cNvPicPr>
+              <a:picLocks noChangeAspect="1"/>
+            </p:cNvPicPr>
+            <p:nvPr/>
+          </p:nvPicPr>
+          <p:blipFill>
+            <a:blip r:embed="rId2"/>
+            <a:stretch>
+              <a:fillRect/>
+            </a:stretch>
+          </p:blipFill>
+          <p:spPr>
+            <a:xfrm>
+              <a:off x="1829686" y="0"/>
+              <a:ext cx="8532628" cy="6858000"/>
+            </a:xfrm>
+            <a:prstGeom prst="rect">
+              <a:avLst/>
+            </a:prstGeom>
+          </p:spPr>
+        </p:pic>
+        <p:sp>
+          <p:nvSpPr>
+            <p:cNvPr id="4" name="矩形 3">
+              <a:extLst>
+                <a:ext uri="{FF2B5EF4-FFF2-40B4-BE49-F238E27FC236}">
+                  <a16:creationId xmlns:a16="http://schemas.microsoft.com/office/drawing/2014/main" id="{F5A3CB9D-E905-164A-AA45-BD1A8DF9D29A}"/>
+                </a:ext>
+              </a:extLst>
+            </p:cNvPr>
+            <p:cNvSpPr/>
+            <p:nvPr/>
+          </p:nvSpPr>
+          <p:spPr>
+            <a:xfrm>
+              <a:off x="2817628" y="1722473"/>
+              <a:ext cx="2945219" cy="467833"/>
+            </a:xfrm>
+            <a:prstGeom prst="rect">
+              <a:avLst/>
+            </a:prstGeom>
+            <a:noFill/>
+            <a:ln>
+              <a:solidFill>
+                <a:srgbClr val="FF0000"/>
+              </a:solidFill>
+            </a:ln>
+          </p:spPr>
+          <p:style>
+            <a:lnRef idx="2">
+              <a:schemeClr val="accent1">
+                <a:shade val="50000"/>
+              </a:schemeClr>
+            </a:lnRef>
+            <a:fillRef idx="1">
+              <a:schemeClr val="accent1"/>
+            </a:fillRef>
+            <a:effectRef idx="0">
+              <a:schemeClr val="accent1"/>
+            </a:effectRef>
+            <a:fontRef idx="minor">
+              <a:schemeClr val="lt1"/>
+            </a:fontRef>
+          </p:style>
+          <p:txBody>
+            <a:bodyPr rtlCol="0" anchor="ctr"/>
+            <a:lstStyle/>
+            <a:p>
+              <a:pPr algn="ctr"/>
+              <a:endParaRPr kumimoji="1" lang="zh-TW" altLang="en-US"/>
+            </a:p>
+          </p:txBody>
+        </p:sp>
+      </p:grpSp>
     </p:spTree>
     <p:extLst>
       <p:ext uri="{BB962C8B-B14F-4D97-AF65-F5344CB8AC3E}">
@@ -7307,6 +7410,999 @@
           <a:chExt cx="0" cy="0"/>
         </a:xfrm>
       </p:grpSpPr>
+      <p:grpSp>
+        <p:nvGrpSpPr>
+          <p:cNvPr id="12" name="群組 11">
+            <a:extLst>
+              <a:ext uri="{FF2B5EF4-FFF2-40B4-BE49-F238E27FC236}">
+                <a16:creationId xmlns:a16="http://schemas.microsoft.com/office/drawing/2014/main" id="{603384E4-0EC6-2344-9881-EB98C192A9A5}"/>
+              </a:ext>
+            </a:extLst>
+          </p:cNvPr>
+          <p:cNvGrpSpPr/>
+          <p:nvPr/>
+        </p:nvGrpSpPr>
+        <p:grpSpPr>
+          <a:xfrm>
+            <a:off x="195681" y="0"/>
+            <a:ext cx="11247745" cy="6836735"/>
+            <a:chOff x="195681" y="0"/>
+            <a:chExt cx="11247745" cy="6836735"/>
+          </a:xfrm>
+        </p:grpSpPr>
+        <p:pic>
+          <p:nvPicPr>
+            <p:cNvPr id="3" name="圖片 2">
+              <a:extLst>
+                <a:ext uri="{FF2B5EF4-FFF2-40B4-BE49-F238E27FC236}">
+                  <a16:creationId xmlns:a16="http://schemas.microsoft.com/office/drawing/2014/main" id="{4FD81416-A9CE-9F48-995E-AE1B36DB47BA}"/>
+                </a:ext>
+              </a:extLst>
+            </p:cNvPr>
+            <p:cNvPicPr>
+              <a:picLocks noChangeAspect="1"/>
+            </p:cNvPicPr>
+            <p:nvPr/>
+          </p:nvPicPr>
+          <p:blipFill rotWithShape="1">
+            <a:blip r:embed="rId2"/>
+            <a:srcRect t="311"/>
+            <a:stretch/>
+          </p:blipFill>
+          <p:spPr>
+            <a:xfrm>
+              <a:off x="195681" y="0"/>
+              <a:ext cx="11247745" cy="6836735"/>
+            </a:xfrm>
+            <a:prstGeom prst="rect">
+              <a:avLst/>
+            </a:prstGeom>
+          </p:spPr>
+        </p:pic>
+        <p:sp>
+          <p:nvSpPr>
+            <p:cNvPr id="4" name="矩形 3">
+              <a:extLst>
+                <a:ext uri="{FF2B5EF4-FFF2-40B4-BE49-F238E27FC236}">
+                  <a16:creationId xmlns:a16="http://schemas.microsoft.com/office/drawing/2014/main" id="{06F14242-CA49-9C45-9802-6CAF0F479A3B}"/>
+                </a:ext>
+              </a:extLst>
+            </p:cNvPr>
+            <p:cNvSpPr/>
+            <p:nvPr/>
+          </p:nvSpPr>
+          <p:spPr>
+            <a:xfrm>
+              <a:off x="5305647" y="2062714"/>
+              <a:ext cx="2817628" cy="1275909"/>
+            </a:xfrm>
+            <a:prstGeom prst="rect">
+              <a:avLst/>
+            </a:prstGeom>
+            <a:noFill/>
+            <a:ln>
+              <a:solidFill>
+                <a:srgbClr val="FF0000"/>
+              </a:solidFill>
+            </a:ln>
+          </p:spPr>
+          <p:style>
+            <a:lnRef idx="2">
+              <a:schemeClr val="accent1">
+                <a:shade val="50000"/>
+              </a:schemeClr>
+            </a:lnRef>
+            <a:fillRef idx="1">
+              <a:schemeClr val="accent1"/>
+            </a:fillRef>
+            <a:effectRef idx="0">
+              <a:schemeClr val="accent1"/>
+            </a:effectRef>
+            <a:fontRef idx="minor">
+              <a:schemeClr val="lt1"/>
+            </a:fontRef>
+          </p:style>
+          <p:txBody>
+            <a:bodyPr rtlCol="0" anchor="ctr"/>
+            <a:lstStyle/>
+            <a:p>
+              <a:pPr algn="ctr"/>
+              <a:endParaRPr kumimoji="1" lang="zh-TW" altLang="en-US"/>
+            </a:p>
+          </p:txBody>
+        </p:sp>
+        <p:sp>
+          <p:nvSpPr>
+            <p:cNvPr id="5" name="矩形 4">
+              <a:extLst>
+                <a:ext uri="{FF2B5EF4-FFF2-40B4-BE49-F238E27FC236}">
+                  <a16:creationId xmlns:a16="http://schemas.microsoft.com/office/drawing/2014/main" id="{398D84BD-9DCB-E443-AD2B-C2355C296957}"/>
+                </a:ext>
+              </a:extLst>
+            </p:cNvPr>
+            <p:cNvSpPr/>
+            <p:nvPr/>
+          </p:nvSpPr>
+          <p:spPr>
+            <a:xfrm>
+              <a:off x="4880344" y="4543645"/>
+              <a:ext cx="1254642" cy="272904"/>
+            </a:xfrm>
+            <a:prstGeom prst="rect">
+              <a:avLst/>
+            </a:prstGeom>
+            <a:noFill/>
+            <a:ln>
+              <a:solidFill>
+                <a:srgbClr val="FF0000"/>
+              </a:solidFill>
+            </a:ln>
+          </p:spPr>
+          <p:style>
+            <a:lnRef idx="2">
+              <a:schemeClr val="accent1">
+                <a:shade val="50000"/>
+              </a:schemeClr>
+            </a:lnRef>
+            <a:fillRef idx="1">
+              <a:schemeClr val="accent1"/>
+            </a:fillRef>
+            <a:effectRef idx="0">
+              <a:schemeClr val="accent1"/>
+            </a:effectRef>
+            <a:fontRef idx="minor">
+              <a:schemeClr val="lt1"/>
+            </a:fontRef>
+          </p:style>
+          <p:txBody>
+            <a:bodyPr rtlCol="0" anchor="ctr"/>
+            <a:lstStyle/>
+            <a:p>
+              <a:pPr algn="ctr"/>
+              <a:endParaRPr kumimoji="1" lang="zh-TW" altLang="en-US"/>
+            </a:p>
+          </p:txBody>
+        </p:sp>
+        <p:sp>
+          <p:nvSpPr>
+            <p:cNvPr id="7" name="橢圓 6">
+              <a:extLst>
+                <a:ext uri="{FF2B5EF4-FFF2-40B4-BE49-F238E27FC236}">
+                  <a16:creationId xmlns:a16="http://schemas.microsoft.com/office/drawing/2014/main" id="{1D740622-B723-1C48-9621-C4FFFBB90343}"/>
+                </a:ext>
+              </a:extLst>
+            </p:cNvPr>
+            <p:cNvSpPr/>
+            <p:nvPr/>
+          </p:nvSpPr>
+          <p:spPr>
+            <a:xfrm>
+              <a:off x="7846828" y="1711839"/>
+              <a:ext cx="276447" cy="276447"/>
+            </a:xfrm>
+            <a:prstGeom prst="ellipse">
+              <a:avLst/>
+            </a:prstGeom>
+            <a:solidFill>
+              <a:srgbClr val="FF0000"/>
+            </a:solidFill>
+            <a:ln>
+              <a:solidFill>
+                <a:srgbClr val="FF0000"/>
+              </a:solidFill>
+            </a:ln>
+          </p:spPr>
+          <p:style>
+            <a:lnRef idx="2">
+              <a:schemeClr val="accent1">
+                <a:shade val="50000"/>
+              </a:schemeClr>
+            </a:lnRef>
+            <a:fillRef idx="1">
+              <a:schemeClr val="accent1"/>
+            </a:fillRef>
+            <a:effectRef idx="0">
+              <a:schemeClr val="accent1"/>
+            </a:effectRef>
+            <a:fontRef idx="minor">
+              <a:schemeClr val="lt1"/>
+            </a:fontRef>
+          </p:style>
+          <p:txBody>
+            <a:bodyPr rtlCol="0" anchor="ctr"/>
+            <a:lstStyle/>
+            <a:p>
+              <a:pPr algn="ctr"/>
+              <a:r>
+                <a:rPr kumimoji="1" lang="en-US" altLang="zh-TW" sz="1600" dirty="0">
+                  <a:latin typeface="Josefin Sans" pitchFamily="2" charset="0"/>
+                </a:rPr>
+                <a:t>1</a:t>
+              </a:r>
+              <a:endParaRPr kumimoji="1" lang="zh-TW" altLang="en-US" sz="1600" dirty="0">
+                <a:latin typeface="Josefin Sans" pitchFamily="2" charset="0"/>
+              </a:endParaRPr>
+            </a:p>
+          </p:txBody>
+        </p:sp>
+        <p:sp>
+          <p:nvSpPr>
+            <p:cNvPr id="8" name="文字方塊 7">
+              <a:extLst>
+                <a:ext uri="{FF2B5EF4-FFF2-40B4-BE49-F238E27FC236}">
+                  <a16:creationId xmlns:a16="http://schemas.microsoft.com/office/drawing/2014/main" id="{8CB9E887-D438-2F4D-ABDB-043CD3DB4D57}"/>
+                </a:ext>
+              </a:extLst>
+            </p:cNvPr>
+            <p:cNvSpPr txBox="1"/>
+            <p:nvPr/>
+          </p:nvSpPr>
+          <p:spPr>
+            <a:xfrm>
+              <a:off x="8123275" y="1680785"/>
+              <a:ext cx="1826141" cy="338554"/>
+            </a:xfrm>
+            <a:prstGeom prst="rect">
+              <a:avLst/>
+            </a:prstGeom>
+            <a:noFill/>
+          </p:spPr>
+          <p:txBody>
+            <a:bodyPr wrap="none" rtlCol="0">
+              <a:spAutoFit/>
+            </a:bodyPr>
+            <a:lstStyle/>
+            <a:p>
+              <a:r>
+                <a:rPr kumimoji="1" lang="zh-CN" altLang="en-US" sz="1600" dirty="0">
+                  <a:solidFill>
+                    <a:srgbClr val="FF0000"/>
+                  </a:solidFill>
+                  <a:latin typeface="+mj-lt"/>
+                </a:rPr>
+                <a:t>輸入帳號密碼資訊</a:t>
+              </a:r>
+              <a:endParaRPr kumimoji="1" lang="zh-TW" altLang="en-US" sz="1600" dirty="0">
+                <a:solidFill>
+                  <a:srgbClr val="FF0000"/>
+                </a:solidFill>
+                <a:latin typeface="+mj-lt"/>
+              </a:endParaRPr>
+            </a:p>
+          </p:txBody>
+        </p:sp>
+        <p:sp>
+          <p:nvSpPr>
+            <p:cNvPr id="9" name="橢圓 8">
+              <a:extLst>
+                <a:ext uri="{FF2B5EF4-FFF2-40B4-BE49-F238E27FC236}">
+                  <a16:creationId xmlns:a16="http://schemas.microsoft.com/office/drawing/2014/main" id="{AC4D23B1-413C-9E4D-84B7-1F3BE45888F5}"/>
+                </a:ext>
+              </a:extLst>
+            </p:cNvPr>
+            <p:cNvSpPr/>
+            <p:nvPr/>
+          </p:nvSpPr>
+          <p:spPr>
+            <a:xfrm>
+              <a:off x="5369441" y="4817391"/>
+              <a:ext cx="276447" cy="276447"/>
+            </a:xfrm>
+            <a:prstGeom prst="ellipse">
+              <a:avLst/>
+            </a:prstGeom>
+            <a:solidFill>
+              <a:srgbClr val="FF0000"/>
+            </a:solidFill>
+            <a:ln>
+              <a:solidFill>
+                <a:srgbClr val="FF0000"/>
+              </a:solidFill>
+            </a:ln>
+          </p:spPr>
+          <p:style>
+            <a:lnRef idx="2">
+              <a:schemeClr val="accent1">
+                <a:shade val="50000"/>
+              </a:schemeClr>
+            </a:lnRef>
+            <a:fillRef idx="1">
+              <a:schemeClr val="accent1"/>
+            </a:fillRef>
+            <a:effectRef idx="0">
+              <a:schemeClr val="accent1"/>
+            </a:effectRef>
+            <a:fontRef idx="minor">
+              <a:schemeClr val="lt1"/>
+            </a:fontRef>
+          </p:style>
+          <p:txBody>
+            <a:bodyPr rtlCol="0" anchor="ctr"/>
+            <a:lstStyle/>
+            <a:p>
+              <a:pPr algn="ctr"/>
+              <a:r>
+                <a:rPr kumimoji="1" lang="en-US" altLang="zh-TW" sz="1600" dirty="0">
+                  <a:latin typeface="Josefin Sans" pitchFamily="2" charset="0"/>
+                </a:rPr>
+                <a:t>2</a:t>
+              </a:r>
+              <a:endParaRPr kumimoji="1" lang="zh-TW" altLang="en-US" sz="1600" dirty="0">
+                <a:latin typeface="Josefin Sans" pitchFamily="2" charset="0"/>
+              </a:endParaRPr>
+            </a:p>
+          </p:txBody>
+        </p:sp>
+        <p:sp>
+          <p:nvSpPr>
+            <p:cNvPr id="10" name="文字方塊 9">
+              <a:extLst>
+                <a:ext uri="{FF2B5EF4-FFF2-40B4-BE49-F238E27FC236}">
+                  <a16:creationId xmlns:a16="http://schemas.microsoft.com/office/drawing/2014/main" id="{CEE40F7E-91B9-1A44-A7B1-31F87C94D4BD}"/>
+                </a:ext>
+              </a:extLst>
+            </p:cNvPr>
+            <p:cNvSpPr txBox="1"/>
+            <p:nvPr/>
+          </p:nvSpPr>
+          <p:spPr>
+            <a:xfrm>
+              <a:off x="5645888" y="4797811"/>
+              <a:ext cx="3796039" cy="338554"/>
+            </a:xfrm>
+            <a:prstGeom prst="rect">
+              <a:avLst/>
+            </a:prstGeom>
+            <a:noFill/>
+          </p:spPr>
+          <p:txBody>
+            <a:bodyPr wrap="none" rtlCol="0">
+              <a:spAutoFit/>
+            </a:bodyPr>
+            <a:lstStyle/>
+            <a:p>
+              <a:r>
+                <a:rPr kumimoji="1" lang="zh-CN" altLang="en-US" sz="1600" dirty="0">
+                  <a:solidFill>
+                    <a:srgbClr val="FF0000"/>
+                  </a:solidFill>
+                  <a:latin typeface="+mj-lt"/>
+                </a:rPr>
+                <a:t>增加至</a:t>
+              </a:r>
+              <a:r>
+                <a:rPr kumimoji="1" lang="en-US" altLang="zh-CN" sz="1600" dirty="0">
+                  <a:solidFill>
+                    <a:srgbClr val="FF0000"/>
+                  </a:solidFill>
+                  <a:latin typeface="+mj-lt"/>
+                </a:rPr>
+                <a:t>Favorites</a:t>
+              </a:r>
+              <a:r>
+                <a:rPr kumimoji="1" lang="zh-CN" altLang="en-US" sz="1600" dirty="0">
+                  <a:solidFill>
+                    <a:srgbClr val="FF0000"/>
+                  </a:solidFill>
+                  <a:latin typeface="+mj-lt"/>
+                </a:rPr>
+                <a:t>，下次登入即可快速登入</a:t>
+              </a:r>
+              <a:endParaRPr kumimoji="1" lang="zh-TW" altLang="en-US" sz="1600" dirty="0">
+                <a:solidFill>
+                  <a:srgbClr val="FF0000"/>
+                </a:solidFill>
+                <a:latin typeface="+mj-lt"/>
+              </a:endParaRPr>
+            </a:p>
+          </p:txBody>
+        </p:sp>
+        <p:sp>
+          <p:nvSpPr>
+            <p:cNvPr id="11" name="手繪多邊形 10">
+              <a:extLst>
+                <a:ext uri="{FF2B5EF4-FFF2-40B4-BE49-F238E27FC236}">
+                  <a16:creationId xmlns:a16="http://schemas.microsoft.com/office/drawing/2014/main" id="{C07CAC84-5071-0B43-B313-84799A9B697A}"/>
+                </a:ext>
+              </a:extLst>
+            </p:cNvPr>
+            <p:cNvSpPr/>
+            <p:nvPr/>
+          </p:nvSpPr>
+          <p:spPr>
+            <a:xfrm>
+              <a:off x="934575" y="1740303"/>
+              <a:ext cx="3765016" cy="3150804"/>
+            </a:xfrm>
+            <a:custGeom>
+              <a:avLst/>
+              <a:gdLst>
+                <a:gd name="connsiteX0" fmla="*/ 3765016 w 3765016"/>
+                <a:gd name="connsiteY0" fmla="*/ 3140041 h 3150804"/>
+                <a:gd name="connsiteX1" fmla="*/ 3690588 w 3765016"/>
+                <a:gd name="connsiteY1" fmla="*/ 3150674 h 3150804"/>
+                <a:gd name="connsiteX2" fmla="*/ 2935676 w 3765016"/>
+                <a:gd name="connsiteY2" fmla="*/ 3054981 h 3150804"/>
+                <a:gd name="connsiteX3" fmla="*/ 2637965 w 3765016"/>
+                <a:gd name="connsiteY3" fmla="*/ 2959288 h 3150804"/>
+                <a:gd name="connsiteX4" fmla="*/ 2414681 w 3765016"/>
+                <a:gd name="connsiteY4" fmla="*/ 2884860 h 3150804"/>
+                <a:gd name="connsiteX5" fmla="*/ 2170132 w 3765016"/>
+                <a:gd name="connsiteY5" fmla="*/ 2778534 h 3150804"/>
+                <a:gd name="connsiteX6" fmla="*/ 1840523 w 3765016"/>
+                <a:gd name="connsiteY6" fmla="*/ 2629678 h 3150804"/>
+                <a:gd name="connsiteX7" fmla="*/ 1744830 w 3765016"/>
+                <a:gd name="connsiteY7" fmla="*/ 2576516 h 3150804"/>
+                <a:gd name="connsiteX8" fmla="*/ 1574709 w 3765016"/>
+                <a:gd name="connsiteY8" fmla="*/ 2448925 h 3150804"/>
+                <a:gd name="connsiteX9" fmla="*/ 1532178 w 3765016"/>
+                <a:gd name="connsiteY9" fmla="*/ 2417027 h 3150804"/>
+                <a:gd name="connsiteX10" fmla="*/ 1447118 w 3765016"/>
+                <a:gd name="connsiteY10" fmla="*/ 2353232 h 3150804"/>
+                <a:gd name="connsiteX11" fmla="*/ 1383323 w 3765016"/>
+                <a:gd name="connsiteY11" fmla="*/ 2310702 h 3150804"/>
+                <a:gd name="connsiteX12" fmla="*/ 1308895 w 3765016"/>
+                <a:gd name="connsiteY12" fmla="*/ 2246906 h 3150804"/>
+                <a:gd name="connsiteX13" fmla="*/ 1191937 w 3765016"/>
+                <a:gd name="connsiteY13" fmla="*/ 2161846 h 3150804"/>
+                <a:gd name="connsiteX14" fmla="*/ 1096244 w 3765016"/>
+                <a:gd name="connsiteY14" fmla="*/ 2066153 h 3150804"/>
+                <a:gd name="connsiteX15" fmla="*/ 1043081 w 3765016"/>
+                <a:gd name="connsiteY15" fmla="*/ 2012990 h 3150804"/>
+                <a:gd name="connsiteX16" fmla="*/ 989918 w 3765016"/>
+                <a:gd name="connsiteY16" fmla="*/ 1959827 h 3150804"/>
+                <a:gd name="connsiteX17" fmla="*/ 936755 w 3765016"/>
+                <a:gd name="connsiteY17" fmla="*/ 1906664 h 3150804"/>
+                <a:gd name="connsiteX18" fmla="*/ 894225 w 3765016"/>
+                <a:gd name="connsiteY18" fmla="*/ 1853502 h 3150804"/>
+                <a:gd name="connsiteX19" fmla="*/ 756002 w 3765016"/>
+                <a:gd name="connsiteY19" fmla="*/ 1694013 h 3150804"/>
+                <a:gd name="connsiteX20" fmla="*/ 724104 w 3765016"/>
+                <a:gd name="connsiteY20" fmla="*/ 1651483 h 3150804"/>
+                <a:gd name="connsiteX21" fmla="*/ 681574 w 3765016"/>
+                <a:gd name="connsiteY21" fmla="*/ 1598320 h 3150804"/>
+                <a:gd name="connsiteX22" fmla="*/ 660309 w 3765016"/>
+                <a:gd name="connsiteY22" fmla="*/ 1555790 h 3150804"/>
+                <a:gd name="connsiteX23" fmla="*/ 628411 w 3765016"/>
+                <a:gd name="connsiteY23" fmla="*/ 1523892 h 3150804"/>
+                <a:gd name="connsiteX24" fmla="*/ 564616 w 3765016"/>
+                <a:gd name="connsiteY24" fmla="*/ 1438832 h 3150804"/>
+                <a:gd name="connsiteX25" fmla="*/ 532718 w 3765016"/>
+                <a:gd name="connsiteY25" fmla="*/ 1396302 h 3150804"/>
+                <a:gd name="connsiteX26" fmla="*/ 511453 w 3765016"/>
+                <a:gd name="connsiteY26" fmla="*/ 1343139 h 3150804"/>
+                <a:gd name="connsiteX27" fmla="*/ 479555 w 3765016"/>
+                <a:gd name="connsiteY27" fmla="*/ 1300609 h 3150804"/>
+                <a:gd name="connsiteX28" fmla="*/ 415760 w 3765016"/>
+                <a:gd name="connsiteY28" fmla="*/ 1194283 h 3150804"/>
+                <a:gd name="connsiteX29" fmla="*/ 362597 w 3765016"/>
+                <a:gd name="connsiteY29" fmla="*/ 1087957 h 3150804"/>
+                <a:gd name="connsiteX30" fmla="*/ 330699 w 3765016"/>
+                <a:gd name="connsiteY30" fmla="*/ 1002897 h 3150804"/>
+                <a:gd name="connsiteX31" fmla="*/ 298802 w 3765016"/>
+                <a:gd name="connsiteY31" fmla="*/ 917837 h 3150804"/>
+                <a:gd name="connsiteX32" fmla="*/ 277537 w 3765016"/>
+                <a:gd name="connsiteY32" fmla="*/ 822144 h 3150804"/>
+                <a:gd name="connsiteX33" fmla="*/ 266904 w 3765016"/>
+                <a:gd name="connsiteY33" fmla="*/ 779613 h 3150804"/>
+                <a:gd name="connsiteX34" fmla="*/ 256272 w 3765016"/>
+                <a:gd name="connsiteY34" fmla="*/ 726450 h 3150804"/>
+                <a:gd name="connsiteX35" fmla="*/ 245639 w 3765016"/>
+                <a:gd name="connsiteY35" fmla="*/ 609492 h 3150804"/>
+                <a:gd name="connsiteX36" fmla="*/ 235006 w 3765016"/>
+                <a:gd name="connsiteY36" fmla="*/ 566962 h 3150804"/>
+                <a:gd name="connsiteX37" fmla="*/ 224374 w 3765016"/>
+                <a:gd name="connsiteY37" fmla="*/ 396841 h 3150804"/>
+                <a:gd name="connsiteX38" fmla="*/ 213741 w 3765016"/>
+                <a:gd name="connsiteY38" fmla="*/ 3437 h 3150804"/>
+                <a:gd name="connsiteX39" fmla="*/ 181844 w 3765016"/>
+                <a:gd name="connsiteY39" fmla="*/ 24702 h 3150804"/>
+                <a:gd name="connsiteX40" fmla="*/ 139313 w 3765016"/>
+                <a:gd name="connsiteY40" fmla="*/ 77864 h 3150804"/>
+                <a:gd name="connsiteX41" fmla="*/ 43620 w 3765016"/>
+                <a:gd name="connsiteY41" fmla="*/ 226720 h 3150804"/>
+                <a:gd name="connsiteX42" fmla="*/ 1090 w 3765016"/>
+                <a:gd name="connsiteY42" fmla="*/ 301148 h 3150804"/>
+                <a:gd name="connsiteX43" fmla="*/ 43620 w 3765016"/>
+                <a:gd name="connsiteY43" fmla="*/ 216088 h 3150804"/>
+                <a:gd name="connsiteX44" fmla="*/ 118048 w 3765016"/>
+                <a:gd name="connsiteY44" fmla="*/ 141660 h 3150804"/>
+                <a:gd name="connsiteX45" fmla="*/ 149946 w 3765016"/>
+                <a:gd name="connsiteY45" fmla="*/ 99130 h 3150804"/>
+                <a:gd name="connsiteX46" fmla="*/ 171211 w 3765016"/>
+                <a:gd name="connsiteY46" fmla="*/ 67232 h 3150804"/>
+                <a:gd name="connsiteX47" fmla="*/ 203109 w 3765016"/>
+                <a:gd name="connsiteY47" fmla="*/ 45967 h 3150804"/>
+                <a:gd name="connsiteX48" fmla="*/ 224374 w 3765016"/>
+                <a:gd name="connsiteY48" fmla="*/ 14069 h 3150804"/>
+                <a:gd name="connsiteX49" fmla="*/ 266904 w 3765016"/>
+                <a:gd name="connsiteY49" fmla="*/ 77864 h 3150804"/>
+                <a:gd name="connsiteX50" fmla="*/ 309434 w 3765016"/>
+                <a:gd name="connsiteY50" fmla="*/ 141660 h 3150804"/>
+                <a:gd name="connsiteX51" fmla="*/ 330699 w 3765016"/>
+                <a:gd name="connsiteY51" fmla="*/ 173557 h 3150804"/>
+                <a:gd name="connsiteX52" fmla="*/ 362597 w 3765016"/>
+                <a:gd name="connsiteY52" fmla="*/ 194823 h 3150804"/>
+                <a:gd name="connsiteX53" fmla="*/ 415760 w 3765016"/>
+                <a:gd name="connsiteY53" fmla="*/ 247985 h 3150804"/>
+                <a:gd name="connsiteX54" fmla="*/ 405127 w 3765016"/>
+                <a:gd name="connsiteY54" fmla="*/ 247985 h 3150804"/>
+              </a:gdLst>
+              <a:ahLst/>
+              <a:cxnLst>
+                <a:cxn ang="0">
+                  <a:pos x="connsiteX0" y="connsiteY0"/>
+                </a:cxn>
+                <a:cxn ang="0">
+                  <a:pos x="connsiteX1" y="connsiteY1"/>
+                </a:cxn>
+                <a:cxn ang="0">
+                  <a:pos x="connsiteX2" y="connsiteY2"/>
+                </a:cxn>
+                <a:cxn ang="0">
+                  <a:pos x="connsiteX3" y="connsiteY3"/>
+                </a:cxn>
+                <a:cxn ang="0">
+                  <a:pos x="connsiteX4" y="connsiteY4"/>
+                </a:cxn>
+                <a:cxn ang="0">
+                  <a:pos x="connsiteX5" y="connsiteY5"/>
+                </a:cxn>
+                <a:cxn ang="0">
+                  <a:pos x="connsiteX6" y="connsiteY6"/>
+                </a:cxn>
+                <a:cxn ang="0">
+                  <a:pos x="connsiteX7" y="connsiteY7"/>
+                </a:cxn>
+                <a:cxn ang="0">
+                  <a:pos x="connsiteX8" y="connsiteY8"/>
+                </a:cxn>
+                <a:cxn ang="0">
+                  <a:pos x="connsiteX9" y="connsiteY9"/>
+                </a:cxn>
+                <a:cxn ang="0">
+                  <a:pos x="connsiteX10" y="connsiteY10"/>
+                </a:cxn>
+                <a:cxn ang="0">
+                  <a:pos x="connsiteX11" y="connsiteY11"/>
+                </a:cxn>
+                <a:cxn ang="0">
+                  <a:pos x="connsiteX12" y="connsiteY12"/>
+                </a:cxn>
+                <a:cxn ang="0">
+                  <a:pos x="connsiteX13" y="connsiteY13"/>
+                </a:cxn>
+                <a:cxn ang="0">
+                  <a:pos x="connsiteX14" y="connsiteY14"/>
+                </a:cxn>
+                <a:cxn ang="0">
+                  <a:pos x="connsiteX15" y="connsiteY15"/>
+                </a:cxn>
+                <a:cxn ang="0">
+                  <a:pos x="connsiteX16" y="connsiteY16"/>
+                </a:cxn>
+                <a:cxn ang="0">
+                  <a:pos x="connsiteX17" y="connsiteY17"/>
+                </a:cxn>
+                <a:cxn ang="0">
+                  <a:pos x="connsiteX18" y="connsiteY18"/>
+                </a:cxn>
+                <a:cxn ang="0">
+                  <a:pos x="connsiteX19" y="connsiteY19"/>
+                </a:cxn>
+                <a:cxn ang="0">
+                  <a:pos x="connsiteX20" y="connsiteY20"/>
+                </a:cxn>
+                <a:cxn ang="0">
+                  <a:pos x="connsiteX21" y="connsiteY21"/>
+                </a:cxn>
+                <a:cxn ang="0">
+                  <a:pos x="connsiteX22" y="connsiteY22"/>
+                </a:cxn>
+                <a:cxn ang="0">
+                  <a:pos x="connsiteX23" y="connsiteY23"/>
+                </a:cxn>
+                <a:cxn ang="0">
+                  <a:pos x="connsiteX24" y="connsiteY24"/>
+                </a:cxn>
+                <a:cxn ang="0">
+                  <a:pos x="connsiteX25" y="connsiteY25"/>
+                </a:cxn>
+                <a:cxn ang="0">
+                  <a:pos x="connsiteX26" y="connsiteY26"/>
+                </a:cxn>
+                <a:cxn ang="0">
+                  <a:pos x="connsiteX27" y="connsiteY27"/>
+                </a:cxn>
+                <a:cxn ang="0">
+                  <a:pos x="connsiteX28" y="connsiteY28"/>
+                </a:cxn>
+                <a:cxn ang="0">
+                  <a:pos x="connsiteX29" y="connsiteY29"/>
+                </a:cxn>
+                <a:cxn ang="0">
+                  <a:pos x="connsiteX30" y="connsiteY30"/>
+                </a:cxn>
+                <a:cxn ang="0">
+                  <a:pos x="connsiteX31" y="connsiteY31"/>
+                </a:cxn>
+                <a:cxn ang="0">
+                  <a:pos x="connsiteX32" y="connsiteY32"/>
+                </a:cxn>
+                <a:cxn ang="0">
+                  <a:pos x="connsiteX33" y="connsiteY33"/>
+                </a:cxn>
+                <a:cxn ang="0">
+                  <a:pos x="connsiteX34" y="connsiteY34"/>
+                </a:cxn>
+                <a:cxn ang="0">
+                  <a:pos x="connsiteX35" y="connsiteY35"/>
+                </a:cxn>
+                <a:cxn ang="0">
+                  <a:pos x="connsiteX36" y="connsiteY36"/>
+                </a:cxn>
+                <a:cxn ang="0">
+                  <a:pos x="connsiteX37" y="connsiteY37"/>
+                </a:cxn>
+                <a:cxn ang="0">
+                  <a:pos x="connsiteX38" y="connsiteY38"/>
+                </a:cxn>
+                <a:cxn ang="0">
+                  <a:pos x="connsiteX39" y="connsiteY39"/>
+                </a:cxn>
+                <a:cxn ang="0">
+                  <a:pos x="connsiteX40" y="connsiteY40"/>
+                </a:cxn>
+                <a:cxn ang="0">
+                  <a:pos x="connsiteX41" y="connsiteY41"/>
+                </a:cxn>
+                <a:cxn ang="0">
+                  <a:pos x="connsiteX42" y="connsiteY42"/>
+                </a:cxn>
+                <a:cxn ang="0">
+                  <a:pos x="connsiteX43" y="connsiteY43"/>
+                </a:cxn>
+                <a:cxn ang="0">
+                  <a:pos x="connsiteX44" y="connsiteY44"/>
+                </a:cxn>
+                <a:cxn ang="0">
+                  <a:pos x="connsiteX45" y="connsiteY45"/>
+                </a:cxn>
+                <a:cxn ang="0">
+                  <a:pos x="connsiteX46" y="connsiteY46"/>
+                </a:cxn>
+                <a:cxn ang="0">
+                  <a:pos x="connsiteX47" y="connsiteY47"/>
+                </a:cxn>
+                <a:cxn ang="0">
+                  <a:pos x="connsiteX48" y="connsiteY48"/>
+                </a:cxn>
+                <a:cxn ang="0">
+                  <a:pos x="connsiteX49" y="connsiteY49"/>
+                </a:cxn>
+                <a:cxn ang="0">
+                  <a:pos x="connsiteX50" y="connsiteY50"/>
+                </a:cxn>
+                <a:cxn ang="0">
+                  <a:pos x="connsiteX51" y="connsiteY51"/>
+                </a:cxn>
+                <a:cxn ang="0">
+                  <a:pos x="connsiteX52" y="connsiteY52"/>
+                </a:cxn>
+                <a:cxn ang="0">
+                  <a:pos x="connsiteX53" y="connsiteY53"/>
+                </a:cxn>
+                <a:cxn ang="0">
+                  <a:pos x="connsiteX54" y="connsiteY54"/>
+                </a:cxn>
+              </a:cxnLst>
+              <a:rect l="l" t="t" r="r" b="b"/>
+              <a:pathLst>
+                <a:path w="3765016" h="3150804">
+                  <a:moveTo>
+                    <a:pt x="3765016" y="3140041"/>
+                  </a:moveTo>
+                  <a:cubicBezTo>
+                    <a:pt x="3740207" y="3143585"/>
+                    <a:pt x="3715617" y="3151947"/>
+                    <a:pt x="3690588" y="3150674"/>
+                  </a:cubicBezTo>
+                  <a:cubicBezTo>
+                    <a:pt x="3276005" y="3129594"/>
+                    <a:pt x="3238194" y="3145093"/>
+                    <a:pt x="2935676" y="3054981"/>
+                  </a:cubicBezTo>
+                  <a:cubicBezTo>
+                    <a:pt x="2835776" y="3025224"/>
+                    <a:pt x="2734747" y="2998001"/>
+                    <a:pt x="2637965" y="2959288"/>
+                  </a:cubicBezTo>
+                  <a:cubicBezTo>
+                    <a:pt x="2458460" y="2887485"/>
+                    <a:pt x="2534955" y="2904905"/>
+                    <a:pt x="2414681" y="2884860"/>
+                  </a:cubicBezTo>
+                  <a:cubicBezTo>
+                    <a:pt x="2333165" y="2849418"/>
+                    <a:pt x="2252662" y="2811546"/>
+                    <a:pt x="2170132" y="2778534"/>
+                  </a:cubicBezTo>
+                  <a:cubicBezTo>
+                    <a:pt x="2023156" y="2719744"/>
+                    <a:pt x="1982821" y="2708732"/>
+                    <a:pt x="1840523" y="2629678"/>
+                  </a:cubicBezTo>
+                  <a:cubicBezTo>
+                    <a:pt x="1808625" y="2611957"/>
+                    <a:pt x="1775004" y="2597034"/>
+                    <a:pt x="1744830" y="2576516"/>
+                  </a:cubicBezTo>
+                  <a:cubicBezTo>
+                    <a:pt x="1686214" y="2536657"/>
+                    <a:pt x="1631416" y="2491455"/>
+                    <a:pt x="1574709" y="2448925"/>
+                  </a:cubicBezTo>
+                  <a:lnTo>
+                    <a:pt x="1532178" y="2417027"/>
+                  </a:lnTo>
+                  <a:cubicBezTo>
+                    <a:pt x="1503825" y="2395762"/>
+                    <a:pt x="1476607" y="2372891"/>
+                    <a:pt x="1447118" y="2353232"/>
+                  </a:cubicBezTo>
+                  <a:cubicBezTo>
+                    <a:pt x="1425853" y="2339055"/>
+                    <a:pt x="1403580" y="2326285"/>
+                    <a:pt x="1383323" y="2310702"/>
+                  </a:cubicBezTo>
+                  <a:cubicBezTo>
+                    <a:pt x="1357423" y="2290779"/>
+                    <a:pt x="1334795" y="2266829"/>
+                    <a:pt x="1308895" y="2246906"/>
+                  </a:cubicBezTo>
+                  <a:cubicBezTo>
+                    <a:pt x="1239437" y="2193477"/>
+                    <a:pt x="1253318" y="2218842"/>
+                    <a:pt x="1191937" y="2161846"/>
+                  </a:cubicBezTo>
+                  <a:cubicBezTo>
+                    <a:pt x="1158881" y="2131151"/>
+                    <a:pt x="1128142" y="2098051"/>
+                    <a:pt x="1096244" y="2066153"/>
+                  </a:cubicBezTo>
+                  <a:lnTo>
+                    <a:pt x="1043081" y="2012990"/>
+                  </a:lnTo>
+                  <a:lnTo>
+                    <a:pt x="989918" y="1959827"/>
+                  </a:lnTo>
+                  <a:cubicBezTo>
+                    <a:pt x="972197" y="1942106"/>
+                    <a:pt x="952411" y="1926233"/>
+                    <a:pt x="936755" y="1906664"/>
+                  </a:cubicBezTo>
+                  <a:cubicBezTo>
+                    <a:pt x="922578" y="1888943"/>
+                    <a:pt x="909406" y="1870370"/>
+                    <a:pt x="894225" y="1853502"/>
+                  </a:cubicBezTo>
+                  <a:cubicBezTo>
+                    <a:pt x="758177" y="1702338"/>
+                    <a:pt x="948704" y="1939270"/>
+                    <a:pt x="756002" y="1694013"/>
+                  </a:cubicBezTo>
+                  <a:cubicBezTo>
+                    <a:pt x="745054" y="1680079"/>
+                    <a:pt x="734984" y="1665471"/>
+                    <a:pt x="724104" y="1651483"/>
+                  </a:cubicBezTo>
+                  <a:cubicBezTo>
+                    <a:pt x="710171" y="1633570"/>
+                    <a:pt x="691723" y="1618618"/>
+                    <a:pt x="681574" y="1598320"/>
+                  </a:cubicBezTo>
+                  <a:cubicBezTo>
+                    <a:pt x="674486" y="1584143"/>
+                    <a:pt x="669522" y="1568688"/>
+                    <a:pt x="660309" y="1555790"/>
+                  </a:cubicBezTo>
+                  <a:cubicBezTo>
+                    <a:pt x="651569" y="1543554"/>
+                    <a:pt x="637933" y="1535530"/>
+                    <a:pt x="628411" y="1523892"/>
+                  </a:cubicBezTo>
+                  <a:cubicBezTo>
+                    <a:pt x="605968" y="1496462"/>
+                    <a:pt x="585881" y="1467185"/>
+                    <a:pt x="564616" y="1438832"/>
+                  </a:cubicBezTo>
+                  <a:cubicBezTo>
+                    <a:pt x="553983" y="1424655"/>
+                    <a:pt x="539299" y="1412755"/>
+                    <a:pt x="532718" y="1396302"/>
+                  </a:cubicBezTo>
+                  <a:cubicBezTo>
+                    <a:pt x="525630" y="1378581"/>
+                    <a:pt x="520722" y="1359823"/>
+                    <a:pt x="511453" y="1343139"/>
+                  </a:cubicBezTo>
+                  <a:cubicBezTo>
+                    <a:pt x="502847" y="1327648"/>
+                    <a:pt x="489138" y="1315515"/>
+                    <a:pt x="479555" y="1300609"/>
+                  </a:cubicBezTo>
+                  <a:cubicBezTo>
+                    <a:pt x="457204" y="1265841"/>
+                    <a:pt x="434244" y="1231251"/>
+                    <a:pt x="415760" y="1194283"/>
+                  </a:cubicBezTo>
+                  <a:cubicBezTo>
+                    <a:pt x="398039" y="1158841"/>
+                    <a:pt x="376511" y="1125059"/>
+                    <a:pt x="362597" y="1087957"/>
+                  </a:cubicBezTo>
+                  <a:cubicBezTo>
+                    <a:pt x="351964" y="1059604"/>
+                    <a:pt x="340275" y="1031624"/>
+                    <a:pt x="330699" y="1002897"/>
+                  </a:cubicBezTo>
+                  <a:cubicBezTo>
+                    <a:pt x="301744" y="916033"/>
+                    <a:pt x="342307" y="1004846"/>
+                    <a:pt x="298802" y="917837"/>
+                  </a:cubicBezTo>
+                  <a:cubicBezTo>
+                    <a:pt x="291714" y="885939"/>
+                    <a:pt x="284884" y="853983"/>
+                    <a:pt x="277537" y="822144"/>
+                  </a:cubicBezTo>
+                  <a:cubicBezTo>
+                    <a:pt x="274251" y="807905"/>
+                    <a:pt x="270074" y="793878"/>
+                    <a:pt x="266904" y="779613"/>
+                  </a:cubicBezTo>
+                  <a:cubicBezTo>
+                    <a:pt x="262984" y="761971"/>
+                    <a:pt x="259816" y="744171"/>
+                    <a:pt x="256272" y="726450"/>
+                  </a:cubicBezTo>
+                  <a:cubicBezTo>
+                    <a:pt x="252728" y="687464"/>
+                    <a:pt x="250813" y="648295"/>
+                    <a:pt x="245639" y="609492"/>
+                  </a:cubicBezTo>
+                  <a:cubicBezTo>
+                    <a:pt x="243708" y="595007"/>
+                    <a:pt x="236460" y="581502"/>
+                    <a:pt x="235006" y="566962"/>
+                  </a:cubicBezTo>
+                  <a:cubicBezTo>
+                    <a:pt x="229352" y="510426"/>
+                    <a:pt x="227918" y="453548"/>
+                    <a:pt x="224374" y="396841"/>
+                  </a:cubicBezTo>
+                  <a:cubicBezTo>
+                    <a:pt x="220830" y="265706"/>
+                    <a:pt x="228636" y="133771"/>
+                    <a:pt x="213741" y="3437"/>
+                  </a:cubicBezTo>
+                  <a:cubicBezTo>
+                    <a:pt x="212290" y="-9259"/>
+                    <a:pt x="191822" y="16719"/>
+                    <a:pt x="181844" y="24702"/>
+                  </a:cubicBezTo>
+                  <a:cubicBezTo>
+                    <a:pt x="162076" y="40517"/>
+                    <a:pt x="152711" y="56092"/>
+                    <a:pt x="139313" y="77864"/>
+                  </a:cubicBezTo>
+                  <a:cubicBezTo>
+                    <a:pt x="55983" y="213275"/>
+                    <a:pt x="104784" y="145169"/>
+                    <a:pt x="43620" y="226720"/>
+                  </a:cubicBezTo>
+                  <a:cubicBezTo>
+                    <a:pt x="41633" y="232682"/>
+                    <a:pt x="17184" y="317242"/>
+                    <a:pt x="1090" y="301148"/>
+                  </a:cubicBezTo>
+                  <a:cubicBezTo>
+                    <a:pt x="-7259" y="292799"/>
+                    <a:pt x="34773" y="225918"/>
+                    <a:pt x="43620" y="216088"/>
+                  </a:cubicBezTo>
+                  <a:cubicBezTo>
+                    <a:pt x="67091" y="190009"/>
+                    <a:pt x="96996" y="169728"/>
+                    <a:pt x="118048" y="141660"/>
+                  </a:cubicBezTo>
+                  <a:cubicBezTo>
+                    <a:pt x="128681" y="127483"/>
+                    <a:pt x="139646" y="113550"/>
+                    <a:pt x="149946" y="99130"/>
+                  </a:cubicBezTo>
+                  <a:cubicBezTo>
+                    <a:pt x="157374" y="88731"/>
+                    <a:pt x="162175" y="76268"/>
+                    <a:pt x="171211" y="67232"/>
+                  </a:cubicBezTo>
+                  <a:cubicBezTo>
+                    <a:pt x="180247" y="58196"/>
+                    <a:pt x="192476" y="53055"/>
+                    <a:pt x="203109" y="45967"/>
+                  </a:cubicBezTo>
+                  <a:cubicBezTo>
+                    <a:pt x="210197" y="35334"/>
+                    <a:pt x="211595" y="14069"/>
+                    <a:pt x="224374" y="14069"/>
+                  </a:cubicBezTo>
+                  <a:cubicBezTo>
+                    <a:pt x="255837" y="14069"/>
+                    <a:pt x="257748" y="61383"/>
+                    <a:pt x="266904" y="77864"/>
+                  </a:cubicBezTo>
+                  <a:cubicBezTo>
+                    <a:pt x="279316" y="100205"/>
+                    <a:pt x="295257" y="120395"/>
+                    <a:pt x="309434" y="141660"/>
+                  </a:cubicBezTo>
+                  <a:cubicBezTo>
+                    <a:pt x="316522" y="152292"/>
+                    <a:pt x="320067" y="166469"/>
+                    <a:pt x="330699" y="173557"/>
+                  </a:cubicBezTo>
+                  <a:lnTo>
+                    <a:pt x="362597" y="194823"/>
+                  </a:lnTo>
+                  <a:cubicBezTo>
+                    <a:pt x="419306" y="279885"/>
+                    <a:pt x="344874" y="177099"/>
+                    <a:pt x="415760" y="247985"/>
+                  </a:cubicBezTo>
+                  <a:cubicBezTo>
+                    <a:pt x="418266" y="250491"/>
+                    <a:pt x="408671" y="247985"/>
+                    <a:pt x="405127" y="247985"/>
+                  </a:cubicBezTo>
+                </a:path>
+              </a:pathLst>
+            </a:custGeom>
+            <a:noFill/>
+            <a:ln w="12700">
+              <a:solidFill>
+                <a:schemeClr val="bg2">
+                  <a:lumMod val="50000"/>
+                </a:schemeClr>
+              </a:solidFill>
+              <a:prstDash val="dash"/>
+            </a:ln>
+          </p:spPr>
+          <p:style>
+            <a:lnRef idx="2">
+              <a:schemeClr val="accent1">
+                <a:shade val="50000"/>
+              </a:schemeClr>
+            </a:lnRef>
+            <a:fillRef idx="1">
+              <a:schemeClr val="accent1"/>
+            </a:fillRef>
+            <a:effectRef idx="0">
+              <a:schemeClr val="accent1"/>
+            </a:effectRef>
+            <a:fontRef idx="minor">
+              <a:schemeClr val="lt1"/>
+            </a:fontRef>
+          </p:style>
+          <p:txBody>
+            <a:bodyPr rtlCol="0" anchor="ctr"/>
+            <a:lstStyle/>
+            <a:p>
+              <a:pPr algn="ctr"/>
+              <a:endParaRPr kumimoji="1" lang="zh-TW" altLang="en-US"/>
+            </a:p>
+          </p:txBody>
+        </p:sp>
+      </p:grpSp>
     </p:spTree>
     <p:extLst>
       <p:ext uri="{BB962C8B-B14F-4D97-AF65-F5344CB8AC3E}">
@@ -7337,6 +8433,154 @@
           <a:chExt cx="0" cy="0"/>
         </a:xfrm>
       </p:grpSpPr>
+      <p:grpSp>
+        <p:nvGrpSpPr>
+          <p:cNvPr id="6" name="群組 5">
+            <a:extLst>
+              <a:ext uri="{FF2B5EF4-FFF2-40B4-BE49-F238E27FC236}">
+                <a16:creationId xmlns:a16="http://schemas.microsoft.com/office/drawing/2014/main" id="{901EA9B0-0DFA-AD43-8CFA-118FC0641527}"/>
+              </a:ext>
+            </a:extLst>
+          </p:cNvPr>
+          <p:cNvGrpSpPr/>
+          <p:nvPr/>
+        </p:nvGrpSpPr>
+        <p:grpSpPr>
+          <a:xfrm>
+            <a:off x="327177" y="21265"/>
+            <a:ext cx="11239934" cy="6836735"/>
+            <a:chOff x="476033" y="21264"/>
+            <a:chExt cx="11239934" cy="6836735"/>
+          </a:xfrm>
+        </p:grpSpPr>
+        <p:pic>
+          <p:nvPicPr>
+            <p:cNvPr id="3" name="圖片 2">
+              <a:extLst>
+                <a:ext uri="{FF2B5EF4-FFF2-40B4-BE49-F238E27FC236}">
+                  <a16:creationId xmlns:a16="http://schemas.microsoft.com/office/drawing/2014/main" id="{B6A80B53-B008-1B49-A2A9-6920EF200D68}"/>
+                </a:ext>
+              </a:extLst>
+            </p:cNvPr>
+            <p:cNvPicPr>
+              <a:picLocks noChangeAspect="1"/>
+            </p:cNvPicPr>
+            <p:nvPr/>
+          </p:nvPicPr>
+          <p:blipFill rotWithShape="1">
+            <a:blip r:embed="rId2"/>
+            <a:srcRect t="311"/>
+            <a:stretch/>
+          </p:blipFill>
+          <p:spPr>
+            <a:xfrm>
+              <a:off x="476033" y="21264"/>
+              <a:ext cx="11239934" cy="6836735"/>
+            </a:xfrm>
+            <a:prstGeom prst="rect">
+              <a:avLst/>
+            </a:prstGeom>
+          </p:spPr>
+        </p:pic>
+        <p:sp>
+          <p:nvSpPr>
+            <p:cNvPr id="4" name="矩形 3">
+              <a:extLst>
+                <a:ext uri="{FF2B5EF4-FFF2-40B4-BE49-F238E27FC236}">
+                  <a16:creationId xmlns:a16="http://schemas.microsoft.com/office/drawing/2014/main" id="{5682DD8E-E5A7-844B-A269-80F5921370C0}"/>
+                </a:ext>
+              </a:extLst>
+            </p:cNvPr>
+            <p:cNvSpPr/>
+            <p:nvPr/>
+          </p:nvSpPr>
+          <p:spPr>
+            <a:xfrm>
+              <a:off x="552892" y="1024268"/>
+              <a:ext cx="1254642" cy="272904"/>
+            </a:xfrm>
+            <a:prstGeom prst="rect">
+              <a:avLst/>
+            </a:prstGeom>
+            <a:noFill/>
+            <a:ln>
+              <a:solidFill>
+                <a:srgbClr val="FF0000"/>
+              </a:solidFill>
+            </a:ln>
+          </p:spPr>
+          <p:style>
+            <a:lnRef idx="2">
+              <a:schemeClr val="accent1">
+                <a:shade val="50000"/>
+              </a:schemeClr>
+            </a:lnRef>
+            <a:fillRef idx="1">
+              <a:schemeClr val="accent1"/>
+            </a:fillRef>
+            <a:effectRef idx="0">
+              <a:schemeClr val="accent1"/>
+            </a:effectRef>
+            <a:fontRef idx="minor">
+              <a:schemeClr val="lt1"/>
+            </a:fontRef>
+          </p:style>
+          <p:txBody>
+            <a:bodyPr rtlCol="0" anchor="ctr"/>
+            <a:lstStyle/>
+            <a:p>
+              <a:pPr algn="ctr"/>
+              <a:endParaRPr kumimoji="1" lang="zh-TW" altLang="en-US"/>
+            </a:p>
+          </p:txBody>
+        </p:sp>
+        <p:sp>
+          <p:nvSpPr>
+            <p:cNvPr id="5" name="文字方塊 4">
+              <a:extLst>
+                <a:ext uri="{FF2B5EF4-FFF2-40B4-BE49-F238E27FC236}">
+                  <a16:creationId xmlns:a16="http://schemas.microsoft.com/office/drawing/2014/main" id="{75807BD4-30C2-884E-998E-74296DE59417}"/>
+                </a:ext>
+              </a:extLst>
+            </p:cNvPr>
+            <p:cNvSpPr txBox="1"/>
+            <p:nvPr/>
+          </p:nvSpPr>
+          <p:spPr>
+            <a:xfrm>
+              <a:off x="637953" y="1297172"/>
+              <a:ext cx="3057247" cy="338554"/>
+            </a:xfrm>
+            <a:prstGeom prst="rect">
+              <a:avLst/>
+            </a:prstGeom>
+            <a:noFill/>
+          </p:spPr>
+          <p:txBody>
+            <a:bodyPr wrap="none" rtlCol="0">
+              <a:spAutoFit/>
+            </a:bodyPr>
+            <a:lstStyle/>
+            <a:p>
+              <a:r>
+                <a:rPr kumimoji="1" lang="zh-CN" altLang="en-US" sz="1600" dirty="0">
+                  <a:solidFill>
+                    <a:srgbClr val="FF0000"/>
+                  </a:solidFill>
+                  <a:latin typeface="+mj-lt"/>
+                </a:rPr>
+                <a:t>下次登入即可點擊此處快速登入</a:t>
+              </a:r>
+              <a:endParaRPr kumimoji="1" lang="zh-TW" altLang="en-US" sz="1600" dirty="0">
+                <a:solidFill>
+                  <a:srgbClr val="FF0000"/>
+                </a:solidFill>
+                <a:latin typeface="+mj-lt"/>
+              </a:endParaRPr>
+            </a:p>
+          </p:txBody>
+        </p:sp>
+      </p:grpSp>
     </p:spTree>
     <p:extLst>
       <p:ext uri="{BB962C8B-B14F-4D97-AF65-F5344CB8AC3E}">
@@ -7367,6 +8611,820 @@
           <a:chExt cx="0" cy="0"/>
         </a:xfrm>
       </p:grpSpPr>
+      <p:grpSp>
+        <p:nvGrpSpPr>
+          <p:cNvPr id="10" name="群組 9">
+            <a:extLst>
+              <a:ext uri="{FF2B5EF4-FFF2-40B4-BE49-F238E27FC236}">
+                <a16:creationId xmlns:a16="http://schemas.microsoft.com/office/drawing/2014/main" id="{4686C498-C517-6941-990F-AF68C813FA62}"/>
+              </a:ext>
+            </a:extLst>
+          </p:cNvPr>
+          <p:cNvGrpSpPr/>
+          <p:nvPr/>
+        </p:nvGrpSpPr>
+        <p:grpSpPr>
+          <a:xfrm>
+            <a:off x="723604" y="454837"/>
+            <a:ext cx="6959600" cy="3098800"/>
+            <a:chOff x="2616200" y="1879600"/>
+            <a:chExt cx="6959600" cy="3098800"/>
+          </a:xfrm>
+        </p:grpSpPr>
+        <p:pic>
+          <p:nvPicPr>
+            <p:cNvPr id="3" name="圖片 2">
+              <a:extLst>
+                <a:ext uri="{FF2B5EF4-FFF2-40B4-BE49-F238E27FC236}">
+                  <a16:creationId xmlns:a16="http://schemas.microsoft.com/office/drawing/2014/main" id="{10917EC8-0C38-D342-8290-46B1D0E1E2CF}"/>
+                </a:ext>
+              </a:extLst>
+            </p:cNvPr>
+            <p:cNvPicPr>
+              <a:picLocks noChangeAspect="1"/>
+            </p:cNvPicPr>
+            <p:nvPr/>
+          </p:nvPicPr>
+          <p:blipFill>
+            <a:blip r:embed="rId2"/>
+            <a:stretch>
+              <a:fillRect/>
+            </a:stretch>
+          </p:blipFill>
+          <p:spPr>
+            <a:xfrm>
+              <a:off x="2616200" y="1879600"/>
+              <a:ext cx="6959600" cy="3098800"/>
+            </a:xfrm>
+            <a:prstGeom prst="rect">
+              <a:avLst/>
+            </a:prstGeom>
+          </p:spPr>
+        </p:pic>
+        <p:sp>
+          <p:nvSpPr>
+            <p:cNvPr id="4" name="矩形 3">
+              <a:extLst>
+                <a:ext uri="{FF2B5EF4-FFF2-40B4-BE49-F238E27FC236}">
+                  <a16:creationId xmlns:a16="http://schemas.microsoft.com/office/drawing/2014/main" id="{7414ABA6-CD83-704B-B695-0E2DD1406621}"/>
+                </a:ext>
+              </a:extLst>
+            </p:cNvPr>
+            <p:cNvSpPr/>
+            <p:nvPr/>
+          </p:nvSpPr>
+          <p:spPr>
+            <a:xfrm>
+              <a:off x="3976577" y="2647506"/>
+              <a:ext cx="4433776" cy="1064102"/>
+            </a:xfrm>
+            <a:prstGeom prst="rect">
+              <a:avLst/>
+            </a:prstGeom>
+            <a:noFill/>
+            <a:ln>
+              <a:solidFill>
+                <a:srgbClr val="FF0000"/>
+              </a:solidFill>
+            </a:ln>
+          </p:spPr>
+          <p:style>
+            <a:lnRef idx="2">
+              <a:schemeClr val="accent1">
+                <a:shade val="50000"/>
+              </a:schemeClr>
+            </a:lnRef>
+            <a:fillRef idx="1">
+              <a:schemeClr val="accent1"/>
+            </a:fillRef>
+            <a:effectRef idx="0">
+              <a:schemeClr val="accent1"/>
+            </a:effectRef>
+            <a:fontRef idx="minor">
+              <a:schemeClr val="lt1"/>
+            </a:fontRef>
+          </p:style>
+          <p:txBody>
+            <a:bodyPr rtlCol="0" anchor="ctr"/>
+            <a:lstStyle/>
+            <a:p>
+              <a:pPr algn="ctr"/>
+              <a:endParaRPr kumimoji="1" lang="zh-TW" altLang="en-US"/>
+            </a:p>
+          </p:txBody>
+        </p:sp>
+        <p:sp>
+          <p:nvSpPr>
+            <p:cNvPr id="5" name="橢圓 4">
+              <a:extLst>
+                <a:ext uri="{FF2B5EF4-FFF2-40B4-BE49-F238E27FC236}">
+                  <a16:creationId xmlns:a16="http://schemas.microsoft.com/office/drawing/2014/main" id="{2600A754-C0B1-464E-831E-E5C7E0B0B32F}"/>
+                </a:ext>
+              </a:extLst>
+            </p:cNvPr>
+            <p:cNvSpPr/>
+            <p:nvPr/>
+          </p:nvSpPr>
+          <p:spPr>
+            <a:xfrm>
+              <a:off x="6485861" y="2340005"/>
+              <a:ext cx="276447" cy="276447"/>
+            </a:xfrm>
+            <a:prstGeom prst="ellipse">
+              <a:avLst/>
+            </a:prstGeom>
+            <a:solidFill>
+              <a:srgbClr val="FF0000"/>
+            </a:solidFill>
+            <a:ln>
+              <a:solidFill>
+                <a:srgbClr val="FF0000"/>
+              </a:solidFill>
+            </a:ln>
+          </p:spPr>
+          <p:style>
+            <a:lnRef idx="2">
+              <a:schemeClr val="accent1">
+                <a:shade val="50000"/>
+              </a:schemeClr>
+            </a:lnRef>
+            <a:fillRef idx="1">
+              <a:schemeClr val="accent1"/>
+            </a:fillRef>
+            <a:effectRef idx="0">
+              <a:schemeClr val="accent1"/>
+            </a:effectRef>
+            <a:fontRef idx="minor">
+              <a:schemeClr val="lt1"/>
+            </a:fontRef>
+          </p:style>
+          <p:txBody>
+            <a:bodyPr rtlCol="0" anchor="ctr"/>
+            <a:lstStyle/>
+            <a:p>
+              <a:pPr algn="ctr"/>
+              <a:r>
+                <a:rPr kumimoji="1" lang="en-US" altLang="zh-TW" sz="1600" dirty="0">
+                  <a:latin typeface="Josefin Sans" pitchFamily="2" charset="0"/>
+                </a:rPr>
+                <a:t>1</a:t>
+              </a:r>
+              <a:endParaRPr kumimoji="1" lang="zh-TW" altLang="en-US" sz="1600" dirty="0">
+                <a:latin typeface="Josefin Sans" pitchFamily="2" charset="0"/>
+              </a:endParaRPr>
+            </a:p>
+          </p:txBody>
+        </p:sp>
+        <p:sp>
+          <p:nvSpPr>
+            <p:cNvPr id="6" name="文字方塊 5">
+              <a:extLst>
+                <a:ext uri="{FF2B5EF4-FFF2-40B4-BE49-F238E27FC236}">
+                  <a16:creationId xmlns:a16="http://schemas.microsoft.com/office/drawing/2014/main" id="{71E02E38-F18F-CB43-859D-4D316A72D4BD}"/>
+                </a:ext>
+              </a:extLst>
+            </p:cNvPr>
+            <p:cNvSpPr txBox="1"/>
+            <p:nvPr/>
+          </p:nvSpPr>
+          <p:spPr>
+            <a:xfrm>
+              <a:off x="6762308" y="2308951"/>
+              <a:ext cx="1752211" cy="338554"/>
+            </a:xfrm>
+            <a:prstGeom prst="rect">
+              <a:avLst/>
+            </a:prstGeom>
+            <a:noFill/>
+          </p:spPr>
+          <p:txBody>
+            <a:bodyPr wrap="none" rtlCol="0">
+              <a:spAutoFit/>
+            </a:bodyPr>
+            <a:lstStyle/>
+            <a:p>
+              <a:r>
+                <a:rPr kumimoji="1" lang="zh-CN" altLang="en-US" sz="1600" dirty="0">
+                  <a:solidFill>
+                    <a:srgbClr val="FF0000"/>
+                  </a:solidFill>
+                  <a:latin typeface="+mj-lt"/>
+                </a:rPr>
+                <a:t>輸入</a:t>
+              </a:r>
+              <a:r>
+                <a:rPr kumimoji="1" lang="en-US" altLang="zh-CN" sz="1600" dirty="0">
+                  <a:solidFill>
+                    <a:srgbClr val="FF0000"/>
+                  </a:solidFill>
+                  <a:latin typeface="+mj-lt"/>
+                </a:rPr>
+                <a:t>database</a:t>
+              </a:r>
+              <a:r>
+                <a:rPr kumimoji="1" lang="zh-CN" altLang="en-US" sz="1600" dirty="0">
+                  <a:solidFill>
+                    <a:srgbClr val="FF0000"/>
+                  </a:solidFill>
+                  <a:latin typeface="+mj-lt"/>
+                </a:rPr>
+                <a:t>資訊</a:t>
+              </a:r>
+              <a:endParaRPr kumimoji="1" lang="zh-TW" altLang="en-US" sz="1600" dirty="0">
+                <a:solidFill>
+                  <a:srgbClr val="FF0000"/>
+                </a:solidFill>
+                <a:latin typeface="+mj-lt"/>
+              </a:endParaRPr>
+            </a:p>
+          </p:txBody>
+        </p:sp>
+        <p:sp>
+          <p:nvSpPr>
+            <p:cNvPr id="7" name="橢圓 6">
+              <a:extLst>
+                <a:ext uri="{FF2B5EF4-FFF2-40B4-BE49-F238E27FC236}">
+                  <a16:creationId xmlns:a16="http://schemas.microsoft.com/office/drawing/2014/main" id="{55A4819D-CD91-E645-8785-05667171B66B}"/>
+                </a:ext>
+              </a:extLst>
+            </p:cNvPr>
+            <p:cNvSpPr/>
+            <p:nvPr/>
+          </p:nvSpPr>
+          <p:spPr>
+            <a:xfrm>
+              <a:off x="7262484" y="4143320"/>
+              <a:ext cx="276447" cy="276447"/>
+            </a:xfrm>
+            <a:prstGeom prst="ellipse">
+              <a:avLst/>
+            </a:prstGeom>
+            <a:solidFill>
+              <a:srgbClr val="FF0000"/>
+            </a:solidFill>
+            <a:ln>
+              <a:solidFill>
+                <a:srgbClr val="FF0000"/>
+              </a:solidFill>
+            </a:ln>
+          </p:spPr>
+          <p:style>
+            <a:lnRef idx="2">
+              <a:schemeClr val="accent1">
+                <a:shade val="50000"/>
+              </a:schemeClr>
+            </a:lnRef>
+            <a:fillRef idx="1">
+              <a:schemeClr val="accent1"/>
+            </a:fillRef>
+            <a:effectRef idx="0">
+              <a:schemeClr val="accent1"/>
+            </a:effectRef>
+            <a:fontRef idx="minor">
+              <a:schemeClr val="lt1"/>
+            </a:fontRef>
+          </p:style>
+          <p:txBody>
+            <a:bodyPr rtlCol="0" anchor="ctr"/>
+            <a:lstStyle/>
+            <a:p>
+              <a:pPr algn="ctr"/>
+              <a:r>
+                <a:rPr kumimoji="1" lang="en-US" altLang="zh-TW" sz="1600" dirty="0">
+                  <a:latin typeface="Josefin Sans" pitchFamily="2" charset="0"/>
+                </a:rPr>
+                <a:t>2</a:t>
+              </a:r>
+              <a:endParaRPr kumimoji="1" lang="zh-TW" altLang="en-US" sz="1600" dirty="0">
+                <a:latin typeface="Josefin Sans" pitchFamily="2" charset="0"/>
+              </a:endParaRPr>
+            </a:p>
+          </p:txBody>
+        </p:sp>
+        <p:sp>
+          <p:nvSpPr>
+            <p:cNvPr id="8" name="文字方塊 7">
+              <a:extLst>
+                <a:ext uri="{FF2B5EF4-FFF2-40B4-BE49-F238E27FC236}">
+                  <a16:creationId xmlns:a16="http://schemas.microsoft.com/office/drawing/2014/main" id="{45362975-124B-A146-8B6D-77F694D66052}"/>
+                </a:ext>
+              </a:extLst>
+            </p:cNvPr>
+            <p:cNvSpPr txBox="1"/>
+            <p:nvPr/>
+          </p:nvSpPr>
+          <p:spPr>
+            <a:xfrm>
+              <a:off x="7538931" y="4112266"/>
+              <a:ext cx="1951175" cy="338554"/>
+            </a:xfrm>
+            <a:prstGeom prst="rect">
+              <a:avLst/>
+            </a:prstGeom>
+            <a:noFill/>
+          </p:spPr>
+          <p:txBody>
+            <a:bodyPr wrap="square" rtlCol="0">
+              <a:spAutoFit/>
+            </a:bodyPr>
+            <a:lstStyle/>
+            <a:p>
+              <a:r>
+                <a:rPr kumimoji="1" lang="zh-CN" altLang="en-US" sz="1600" dirty="0">
+                  <a:solidFill>
+                    <a:srgbClr val="FF0000"/>
+                  </a:solidFill>
+                  <a:latin typeface="+mj-lt"/>
+                </a:rPr>
+                <a:t>點擊</a:t>
+              </a:r>
+              <a:r>
+                <a:rPr kumimoji="1" lang="en-US" altLang="zh-CN" sz="1600" dirty="0">
+                  <a:solidFill>
+                    <a:srgbClr val="FF0000"/>
+                  </a:solidFill>
+                  <a:latin typeface="+mj-lt"/>
+                </a:rPr>
+                <a:t>Add</a:t>
+              </a:r>
+              <a:r>
+                <a:rPr kumimoji="1" lang="zh-CN" altLang="en-US" sz="1600" dirty="0">
+                  <a:solidFill>
+                    <a:srgbClr val="FF0000"/>
+                  </a:solidFill>
+                  <a:latin typeface="+mj-lt"/>
+                </a:rPr>
+                <a:t>新增資料庫</a:t>
+              </a:r>
+              <a:endParaRPr kumimoji="1" lang="zh-TW" altLang="en-US" sz="1600" dirty="0">
+                <a:solidFill>
+                  <a:srgbClr val="FF0000"/>
+                </a:solidFill>
+                <a:latin typeface="+mj-lt"/>
+              </a:endParaRPr>
+            </a:p>
+          </p:txBody>
+        </p:sp>
+        <p:sp>
+          <p:nvSpPr>
+            <p:cNvPr id="9" name="矩形 8">
+              <a:extLst>
+                <a:ext uri="{FF2B5EF4-FFF2-40B4-BE49-F238E27FC236}">
+                  <a16:creationId xmlns:a16="http://schemas.microsoft.com/office/drawing/2014/main" id="{99CD0049-1034-0944-BDA4-B5451704BEC8}"/>
+                </a:ext>
+              </a:extLst>
+            </p:cNvPr>
+            <p:cNvSpPr/>
+            <p:nvPr/>
+          </p:nvSpPr>
+          <p:spPr>
+            <a:xfrm>
+              <a:off x="7393174" y="3742660"/>
+              <a:ext cx="1017180" cy="338554"/>
+            </a:xfrm>
+            <a:prstGeom prst="rect">
+              <a:avLst/>
+            </a:prstGeom>
+            <a:noFill/>
+            <a:ln>
+              <a:solidFill>
+                <a:srgbClr val="FF0000"/>
+              </a:solidFill>
+            </a:ln>
+          </p:spPr>
+          <p:style>
+            <a:lnRef idx="2">
+              <a:schemeClr val="accent1">
+                <a:shade val="50000"/>
+              </a:schemeClr>
+            </a:lnRef>
+            <a:fillRef idx="1">
+              <a:schemeClr val="accent1"/>
+            </a:fillRef>
+            <a:effectRef idx="0">
+              <a:schemeClr val="accent1"/>
+            </a:effectRef>
+            <a:fontRef idx="minor">
+              <a:schemeClr val="lt1"/>
+            </a:fontRef>
+          </p:style>
+          <p:txBody>
+            <a:bodyPr rtlCol="0" anchor="ctr"/>
+            <a:lstStyle/>
+            <a:p>
+              <a:pPr algn="ctr"/>
+              <a:endParaRPr kumimoji="1" lang="zh-TW" altLang="en-US"/>
+            </a:p>
+          </p:txBody>
+        </p:sp>
+      </p:grpSp>
+      <p:grpSp>
+        <p:nvGrpSpPr>
+          <p:cNvPr id="21" name="群組 20">
+            <a:extLst>
+              <a:ext uri="{FF2B5EF4-FFF2-40B4-BE49-F238E27FC236}">
+                <a16:creationId xmlns:a16="http://schemas.microsoft.com/office/drawing/2014/main" id="{968A94F2-2F05-3B45-ADB0-F679BB8BABCD}"/>
+              </a:ext>
+            </a:extLst>
+          </p:cNvPr>
+          <p:cNvGrpSpPr/>
+          <p:nvPr/>
+        </p:nvGrpSpPr>
+        <p:grpSpPr>
+          <a:xfrm>
+            <a:off x="3641207" y="3751606"/>
+            <a:ext cx="5753100" cy="2628900"/>
+            <a:chOff x="3641207" y="3751606"/>
+            <a:chExt cx="5753100" cy="2628900"/>
+          </a:xfrm>
+        </p:grpSpPr>
+        <p:pic>
+          <p:nvPicPr>
+            <p:cNvPr id="14" name="圖片 13">
+              <a:extLst>
+                <a:ext uri="{FF2B5EF4-FFF2-40B4-BE49-F238E27FC236}">
+                  <a16:creationId xmlns:a16="http://schemas.microsoft.com/office/drawing/2014/main" id="{B7A6756A-7050-8F43-BF62-C82794C76B0C}"/>
+                </a:ext>
+              </a:extLst>
+            </p:cNvPr>
+            <p:cNvPicPr>
+              <a:picLocks noChangeAspect="1"/>
+            </p:cNvPicPr>
+            <p:nvPr/>
+          </p:nvPicPr>
+          <p:blipFill>
+            <a:blip r:embed="rId3"/>
+            <a:stretch>
+              <a:fillRect/>
+            </a:stretch>
+          </p:blipFill>
+          <p:spPr>
+            <a:xfrm>
+              <a:off x="3641207" y="3751606"/>
+              <a:ext cx="5753100" cy="2628900"/>
+            </a:xfrm>
+            <a:prstGeom prst="rect">
+              <a:avLst/>
+            </a:prstGeom>
+          </p:spPr>
+        </p:pic>
+        <p:sp>
+          <p:nvSpPr>
+            <p:cNvPr id="15" name="矩形 14">
+              <a:extLst>
+                <a:ext uri="{FF2B5EF4-FFF2-40B4-BE49-F238E27FC236}">
+                  <a16:creationId xmlns:a16="http://schemas.microsoft.com/office/drawing/2014/main" id="{760D17BE-2CAB-334E-8625-249457D9F4D9}"/>
+                </a:ext>
+              </a:extLst>
+            </p:cNvPr>
+            <p:cNvSpPr/>
+            <p:nvPr/>
+          </p:nvSpPr>
+          <p:spPr>
+            <a:xfrm>
+              <a:off x="4543646" y="4152266"/>
+              <a:ext cx="4433776" cy="1302236"/>
+            </a:xfrm>
+            <a:prstGeom prst="rect">
+              <a:avLst/>
+            </a:prstGeom>
+            <a:noFill/>
+            <a:ln>
+              <a:solidFill>
+                <a:srgbClr val="FF0000"/>
+              </a:solidFill>
+            </a:ln>
+          </p:spPr>
+          <p:style>
+            <a:lnRef idx="2">
+              <a:schemeClr val="accent1">
+                <a:shade val="50000"/>
+              </a:schemeClr>
+            </a:lnRef>
+            <a:fillRef idx="1">
+              <a:schemeClr val="accent1"/>
+            </a:fillRef>
+            <a:effectRef idx="0">
+              <a:schemeClr val="accent1"/>
+            </a:effectRef>
+            <a:fontRef idx="minor">
+              <a:schemeClr val="lt1"/>
+            </a:fontRef>
+          </p:style>
+          <p:txBody>
+            <a:bodyPr rtlCol="0" anchor="ctr"/>
+            <a:lstStyle/>
+            <a:p>
+              <a:pPr algn="ctr"/>
+              <a:endParaRPr kumimoji="1" lang="zh-TW" altLang="en-US"/>
+            </a:p>
+          </p:txBody>
+        </p:sp>
+        <p:sp>
+          <p:nvSpPr>
+            <p:cNvPr id="16" name="橢圓 15">
+              <a:extLst>
+                <a:ext uri="{FF2B5EF4-FFF2-40B4-BE49-F238E27FC236}">
+                  <a16:creationId xmlns:a16="http://schemas.microsoft.com/office/drawing/2014/main" id="{22B406C8-7B11-4440-8C66-CD73F9DD9BA0}"/>
+                </a:ext>
+              </a:extLst>
+            </p:cNvPr>
+            <p:cNvSpPr/>
+            <p:nvPr/>
+          </p:nvSpPr>
+          <p:spPr>
+            <a:xfrm>
+              <a:off x="7052930" y="3844765"/>
+              <a:ext cx="276447" cy="276447"/>
+            </a:xfrm>
+            <a:prstGeom prst="ellipse">
+              <a:avLst/>
+            </a:prstGeom>
+            <a:solidFill>
+              <a:srgbClr val="FF0000"/>
+            </a:solidFill>
+            <a:ln>
+              <a:solidFill>
+                <a:srgbClr val="FF0000"/>
+              </a:solidFill>
+            </a:ln>
+          </p:spPr>
+          <p:style>
+            <a:lnRef idx="2">
+              <a:schemeClr val="accent1">
+                <a:shade val="50000"/>
+              </a:schemeClr>
+            </a:lnRef>
+            <a:fillRef idx="1">
+              <a:schemeClr val="accent1"/>
+            </a:fillRef>
+            <a:effectRef idx="0">
+              <a:schemeClr val="accent1"/>
+            </a:effectRef>
+            <a:fontRef idx="minor">
+              <a:schemeClr val="lt1"/>
+            </a:fontRef>
+          </p:style>
+          <p:txBody>
+            <a:bodyPr rtlCol="0" anchor="ctr"/>
+            <a:lstStyle/>
+            <a:p>
+              <a:pPr algn="ctr"/>
+              <a:r>
+                <a:rPr kumimoji="1" lang="en-US" altLang="zh-TW" sz="1600" dirty="0">
+                  <a:latin typeface="Josefin Sans" pitchFamily="2" charset="0"/>
+                </a:rPr>
+                <a:t>1</a:t>
+              </a:r>
+              <a:endParaRPr kumimoji="1" lang="zh-TW" altLang="en-US" sz="1600" dirty="0">
+                <a:latin typeface="Josefin Sans" pitchFamily="2" charset="0"/>
+              </a:endParaRPr>
+            </a:p>
+          </p:txBody>
+        </p:sp>
+        <p:sp>
+          <p:nvSpPr>
+            <p:cNvPr id="17" name="文字方塊 16">
+              <a:extLst>
+                <a:ext uri="{FF2B5EF4-FFF2-40B4-BE49-F238E27FC236}">
+                  <a16:creationId xmlns:a16="http://schemas.microsoft.com/office/drawing/2014/main" id="{4EB3F017-05FC-D74D-9EB1-8967CFCBECDB}"/>
+                </a:ext>
+              </a:extLst>
+            </p:cNvPr>
+            <p:cNvSpPr txBox="1"/>
+            <p:nvPr/>
+          </p:nvSpPr>
+          <p:spPr>
+            <a:xfrm>
+              <a:off x="7329377" y="3813711"/>
+              <a:ext cx="1419171" cy="338554"/>
+            </a:xfrm>
+            <a:prstGeom prst="rect">
+              <a:avLst/>
+            </a:prstGeom>
+            <a:noFill/>
+          </p:spPr>
+          <p:txBody>
+            <a:bodyPr wrap="none" rtlCol="0">
+              <a:spAutoFit/>
+            </a:bodyPr>
+            <a:lstStyle/>
+            <a:p>
+              <a:r>
+                <a:rPr kumimoji="1" lang="zh-CN" altLang="en-US" sz="1600" dirty="0">
+                  <a:solidFill>
+                    <a:srgbClr val="FF0000"/>
+                  </a:solidFill>
+                  <a:latin typeface="+mj-lt"/>
+                </a:rPr>
+                <a:t>輸入</a:t>
+              </a:r>
+              <a:r>
+                <a:rPr kumimoji="1" lang="en-US" altLang="zh-CN" sz="1600" dirty="0">
+                  <a:solidFill>
+                    <a:srgbClr val="FF0000"/>
+                  </a:solidFill>
+                  <a:latin typeface="+mj-lt"/>
+                </a:rPr>
+                <a:t>table</a:t>
+              </a:r>
+              <a:r>
+                <a:rPr kumimoji="1" lang="zh-CN" altLang="en-US" sz="1600" dirty="0">
+                  <a:solidFill>
+                    <a:srgbClr val="FF0000"/>
+                  </a:solidFill>
+                  <a:latin typeface="+mj-lt"/>
+                </a:rPr>
+                <a:t>資訊</a:t>
+              </a:r>
+              <a:endParaRPr kumimoji="1" lang="zh-TW" altLang="en-US" sz="1600" dirty="0">
+                <a:solidFill>
+                  <a:srgbClr val="FF0000"/>
+                </a:solidFill>
+                <a:latin typeface="+mj-lt"/>
+              </a:endParaRPr>
+            </a:p>
+          </p:txBody>
+        </p:sp>
+        <p:sp>
+          <p:nvSpPr>
+            <p:cNvPr id="18" name="橢圓 17">
+              <a:extLst>
+                <a:ext uri="{FF2B5EF4-FFF2-40B4-BE49-F238E27FC236}">
+                  <a16:creationId xmlns:a16="http://schemas.microsoft.com/office/drawing/2014/main" id="{4BAA7042-810E-DC4D-8D0F-DDF37EC48BF9}"/>
+                </a:ext>
+              </a:extLst>
+            </p:cNvPr>
+            <p:cNvSpPr/>
+            <p:nvPr/>
+          </p:nvSpPr>
+          <p:spPr>
+            <a:xfrm>
+              <a:off x="7166685" y="5884027"/>
+              <a:ext cx="276447" cy="276447"/>
+            </a:xfrm>
+            <a:prstGeom prst="ellipse">
+              <a:avLst/>
+            </a:prstGeom>
+            <a:solidFill>
+              <a:srgbClr val="FF0000"/>
+            </a:solidFill>
+            <a:ln>
+              <a:solidFill>
+                <a:srgbClr val="FF0000"/>
+              </a:solidFill>
+            </a:ln>
+          </p:spPr>
+          <p:style>
+            <a:lnRef idx="2">
+              <a:schemeClr val="accent1">
+                <a:shade val="50000"/>
+              </a:schemeClr>
+            </a:lnRef>
+            <a:fillRef idx="1">
+              <a:schemeClr val="accent1"/>
+            </a:fillRef>
+            <a:effectRef idx="0">
+              <a:schemeClr val="accent1"/>
+            </a:effectRef>
+            <a:fontRef idx="minor">
+              <a:schemeClr val="lt1"/>
+            </a:fontRef>
+          </p:style>
+          <p:txBody>
+            <a:bodyPr rtlCol="0" anchor="ctr"/>
+            <a:lstStyle/>
+            <a:p>
+              <a:pPr algn="ctr"/>
+              <a:r>
+                <a:rPr kumimoji="1" lang="en-US" altLang="zh-TW" sz="1600" dirty="0">
+                  <a:latin typeface="Josefin Sans" pitchFamily="2" charset="0"/>
+                </a:rPr>
+                <a:t>2</a:t>
+              </a:r>
+              <a:endParaRPr kumimoji="1" lang="zh-TW" altLang="en-US" sz="1600" dirty="0">
+                <a:latin typeface="Josefin Sans" pitchFamily="2" charset="0"/>
+              </a:endParaRPr>
+            </a:p>
+          </p:txBody>
+        </p:sp>
+        <p:sp>
+          <p:nvSpPr>
+            <p:cNvPr id="19" name="文字方塊 18">
+              <a:extLst>
+                <a:ext uri="{FF2B5EF4-FFF2-40B4-BE49-F238E27FC236}">
+                  <a16:creationId xmlns:a16="http://schemas.microsoft.com/office/drawing/2014/main" id="{289FD78E-6B56-594E-8F57-F0C92DBAF3F6}"/>
+                </a:ext>
+              </a:extLst>
+            </p:cNvPr>
+            <p:cNvSpPr txBox="1"/>
+            <p:nvPr/>
+          </p:nvSpPr>
+          <p:spPr>
+            <a:xfrm>
+              <a:off x="7443132" y="5852973"/>
+              <a:ext cx="1951175" cy="338554"/>
+            </a:xfrm>
+            <a:prstGeom prst="rect">
+              <a:avLst/>
+            </a:prstGeom>
+            <a:noFill/>
+          </p:spPr>
+          <p:txBody>
+            <a:bodyPr wrap="square" rtlCol="0">
+              <a:spAutoFit/>
+            </a:bodyPr>
+            <a:lstStyle/>
+            <a:p>
+              <a:r>
+                <a:rPr kumimoji="1" lang="zh-CN" altLang="en-US" sz="1600" dirty="0">
+                  <a:solidFill>
+                    <a:srgbClr val="FF0000"/>
+                  </a:solidFill>
+                  <a:latin typeface="+mj-lt"/>
+                </a:rPr>
+                <a:t>點擊</a:t>
+              </a:r>
+              <a:r>
+                <a:rPr kumimoji="1" lang="en-US" altLang="zh-CN" sz="1600" dirty="0">
+                  <a:solidFill>
+                    <a:srgbClr val="FF0000"/>
+                  </a:solidFill>
+                  <a:latin typeface="+mj-lt"/>
+                </a:rPr>
+                <a:t>Add</a:t>
+              </a:r>
+              <a:r>
+                <a:rPr kumimoji="1" lang="zh-CN" altLang="en-US" sz="1600" dirty="0">
+                  <a:solidFill>
+                    <a:srgbClr val="FF0000"/>
+                  </a:solidFill>
+                  <a:latin typeface="+mj-lt"/>
+                </a:rPr>
+                <a:t>新增資料表</a:t>
+              </a:r>
+              <a:endParaRPr kumimoji="1" lang="zh-TW" altLang="en-US" sz="1600" dirty="0">
+                <a:solidFill>
+                  <a:srgbClr val="FF0000"/>
+                </a:solidFill>
+                <a:latin typeface="+mj-lt"/>
+              </a:endParaRPr>
+            </a:p>
+          </p:txBody>
+        </p:sp>
+        <p:sp>
+          <p:nvSpPr>
+            <p:cNvPr id="20" name="矩形 19">
+              <a:extLst>
+                <a:ext uri="{FF2B5EF4-FFF2-40B4-BE49-F238E27FC236}">
+                  <a16:creationId xmlns:a16="http://schemas.microsoft.com/office/drawing/2014/main" id="{2EFA5679-9195-E44B-97AF-9F3F4D6FC85F}"/>
+                </a:ext>
+              </a:extLst>
+            </p:cNvPr>
+            <p:cNvSpPr/>
+            <p:nvPr/>
+          </p:nvSpPr>
+          <p:spPr>
+            <a:xfrm>
+              <a:off x="7739394" y="5483194"/>
+              <a:ext cx="1017180" cy="338554"/>
+            </a:xfrm>
+            <a:prstGeom prst="rect">
+              <a:avLst/>
+            </a:prstGeom>
+            <a:noFill/>
+            <a:ln>
+              <a:solidFill>
+                <a:srgbClr val="FF0000"/>
+              </a:solidFill>
+            </a:ln>
+          </p:spPr>
+          <p:style>
+            <a:lnRef idx="2">
+              <a:schemeClr val="accent1">
+                <a:shade val="50000"/>
+              </a:schemeClr>
+            </a:lnRef>
+            <a:fillRef idx="1">
+              <a:schemeClr val="accent1"/>
+            </a:fillRef>
+            <a:effectRef idx="0">
+              <a:schemeClr val="accent1"/>
+            </a:effectRef>
+            <a:fontRef idx="minor">
+              <a:schemeClr val="lt1"/>
+            </a:fontRef>
+          </p:style>
+          <p:txBody>
+            <a:bodyPr rtlCol="0" anchor="ctr"/>
+            <a:lstStyle/>
+            <a:p>
+              <a:pPr algn="ctr"/>
+              <a:endParaRPr kumimoji="1" lang="zh-TW" altLang="en-US"/>
+            </a:p>
+          </p:txBody>
+        </p:sp>
+      </p:grpSp>
     </p:spTree>
     <p:extLst>
       <p:ext uri="{BB962C8B-B14F-4D97-AF65-F5344CB8AC3E}">

</xml_diff>